<commit_message>
adding initial 3 slides with some sample data
</commit_message>
<xml_diff>
--- a/Siemens Energy.pptx
+++ b/Siemens Energy.pptx
@@ -7,6 +7,8 @@
   <p:sldIdLst>
     <p:sldId id="256" r:id="rId2"/>
     <p:sldId id="257" r:id="rId3"/>
+    <p:sldId id="258" r:id="rId4"/>
+    <p:sldId id="259" r:id="rId5"/>
   </p:sldIdLst>
   <p:sldSz cx="12192000" cy="6858000"/>
   <p:notesSz cx="6858000" cy="9144000"/>
@@ -3399,7 +3401,9 @@
           </a:xfrm>
         </p:spPr>
         <p:txBody>
-          <a:bodyPr/>
+          <a:bodyPr>
+            <a:normAutofit lnSpcReduction="10000"/>
+          </a:bodyPr>
           <a:lstStyle/>
           <a:p>
             <a:r>
@@ -3419,6 +3423,21 @@
           </a:p>
           <a:p>
             <a:endParaRPr lang="en-IN" i="1" dirty="0"/>
+          </a:p>
+          <a:p>
+            <a:r>
+              <a:rPr lang="en-IN" i="1" dirty="0"/>
+              <a:t>								</a:t>
+            </a:r>
+            <a:r>
+              <a:rPr lang="en-IN" sz="1600" i="1" dirty="0"/>
+              <a:t>Date: </a:t>
+            </a:r>
+            <a:r>
+              <a:rPr lang="en-IN" sz="1600" dirty="0"/>
+              <a:t>02-05-2025</a:t>
+            </a:r>
+            <a:endParaRPr lang="en-IN" dirty="0"/>
           </a:p>
         </p:txBody>
       </p:sp>
@@ -3470,17 +3489,20 @@
         </p:nvSpPr>
         <p:spPr>
           <a:xfrm>
-            <a:off x="838200" y="156579"/>
-            <a:ext cx="10515600" cy="315912"/>
+            <a:off x="838200" y="64168"/>
+            <a:ext cx="10515600" cy="408323"/>
           </a:xfrm>
         </p:spPr>
         <p:txBody>
           <a:bodyPr>
-            <a:normAutofit fontScale="90000"/>
+            <a:noAutofit/>
           </a:bodyPr>
           <a:lstStyle/>
           <a:p>
-            <a:endParaRPr lang="en-IN" dirty="0"/>
+            <a:r>
+              <a:rPr lang="en-IN" sz="1800" dirty="0"/>
+              <a:t>Objective and Problem Statement</a:t>
+            </a:r>
           </a:p>
         </p:txBody>
       </p:sp>
@@ -3507,10 +3529,75 @@
           </a:xfrm>
         </p:spPr>
         <p:txBody>
-          <a:bodyPr/>
-          <a:lstStyle/>
-          <a:p>
-            <a:endParaRPr lang="en-IN" dirty="0"/>
+          <a:bodyPr>
+            <a:normAutofit/>
+          </a:bodyPr>
+          <a:lstStyle/>
+          <a:p>
+            <a:r>
+              <a:rPr lang="en-IN" sz="1400" dirty="0"/>
+              <a:t>Generate synthetic defect images using Stable Diffusion.</a:t>
+            </a:r>
+          </a:p>
+          <a:p>
+            <a:r>
+              <a:rPr lang="en-US" sz="1400" dirty="0"/>
+              <a:t>Condition generation on textual prompts (e.g., "a pill with a vertical scratch") and binary masks (e.g., defect regions).</a:t>
+            </a:r>
+            <a:endParaRPr lang="en-IN" sz="1400" dirty="0"/>
+          </a:p>
+          <a:p>
+            <a:r>
+              <a:rPr lang="en-US" sz="1400" dirty="0"/>
+              <a:t>Real-world defect datasets are often limited, imbalanced, or expensive to collect.</a:t>
+            </a:r>
+          </a:p>
+          <a:p>
+            <a:r>
+              <a:rPr lang="en-US" sz="1400" dirty="0"/>
+              <a:t>Synthetic data can augment datasets for training robust defect detection models.</a:t>
+            </a:r>
+          </a:p>
+          <a:p>
+            <a:pPr marL="0" indent="0">
+              <a:buNone/>
+            </a:pPr>
+            <a:endParaRPr lang="en-US" sz="1400" dirty="0"/>
+          </a:p>
+          <a:p>
+            <a:pPr marL="0" indent="0">
+              <a:buNone/>
+            </a:pPr>
+            <a:r>
+              <a:rPr lang="en-US" sz="1400" dirty="0"/>
+              <a:t>Benefits:</a:t>
+            </a:r>
+          </a:p>
+          <a:p>
+            <a:pPr lvl="1"/>
+            <a:r>
+              <a:rPr lang="en-US" sz="1400" dirty="0"/>
+              <a:t>Cost-effective and scalable data generation.</a:t>
+            </a:r>
+          </a:p>
+          <a:p>
+            <a:pPr lvl="1"/>
+            <a:r>
+              <a:rPr lang="en-US" sz="1400" dirty="0"/>
+              <a:t>Improved performance of defect detection algorithms.</a:t>
+            </a:r>
+          </a:p>
+          <a:p>
+            <a:pPr marL="457200" lvl="1" indent="0">
+              <a:buNone/>
+            </a:pPr>
+            <a:endParaRPr lang="en-US" sz="1400" dirty="0"/>
+          </a:p>
+          <a:p>
+            <a:pPr marL="0" indent="0">
+              <a:buNone/>
+            </a:pPr>
+            <a:endParaRPr lang="en-IN" sz="1400" dirty="0"/>
           </a:p>
         </p:txBody>
       </p:sp>
@@ -3518,6 +3605,493 @@
     <p:extLst>
       <p:ext uri="{BB962C8B-B14F-4D97-AF65-F5344CB8AC3E}">
         <p14:creationId xmlns:p14="http://schemas.microsoft.com/office/powerpoint/2010/main" val="3503517371"/>
+      </p:ext>
+    </p:extLst>
+  </p:cSld>
+  <p:clrMapOvr>
+    <a:masterClrMapping/>
+  </p:clrMapOvr>
+</p:sld>
+</file>
+
+<file path=ppt/slides/slide3.xml><?xml version="1.0" encoding="utf-8"?>
+<p:sld xmlns:a="http://schemas.openxmlformats.org/drawingml/2006/main" xmlns:r="http://schemas.openxmlformats.org/officeDocument/2006/relationships" xmlns:p="http://schemas.openxmlformats.org/presentationml/2006/main">
+  <p:cSld>
+    <p:spTree>
+      <p:nvGrpSpPr>
+        <p:cNvPr id="1" name="">
+          <a:extLst>
+            <a:ext uri="{FF2B5EF4-FFF2-40B4-BE49-F238E27FC236}">
+              <a16:creationId xmlns:a16="http://schemas.microsoft.com/office/drawing/2014/main" id="{A5922A7B-FA2A-CFBA-E087-6CA248F85328}"/>
+            </a:ext>
+          </a:extLst>
+        </p:cNvPr>
+        <p:cNvGrpSpPr/>
+        <p:nvPr/>
+      </p:nvGrpSpPr>
+      <p:grpSpPr>
+        <a:xfrm>
+          <a:off x="0" y="0"/>
+          <a:ext cx="0" cy="0"/>
+          <a:chOff x="0" y="0"/>
+          <a:chExt cx="0" cy="0"/>
+        </a:xfrm>
+      </p:grpSpPr>
+      <p:sp>
+        <p:nvSpPr>
+          <p:cNvPr id="2" name="Title 1">
+            <a:extLst>
+              <a:ext uri="{FF2B5EF4-FFF2-40B4-BE49-F238E27FC236}">
+                <a16:creationId xmlns:a16="http://schemas.microsoft.com/office/drawing/2014/main" id="{A84F32FC-DEDC-87AB-4666-FA8006A38591}"/>
+              </a:ext>
+            </a:extLst>
+          </p:cNvPr>
+          <p:cNvSpPr>
+            <a:spLocks noGrp="1"/>
+          </p:cNvSpPr>
+          <p:nvPr>
+            <p:ph type="title"/>
+          </p:nvPr>
+        </p:nvSpPr>
+        <p:spPr>
+          <a:xfrm>
+            <a:off x="838200" y="64168"/>
+            <a:ext cx="10515600" cy="408323"/>
+          </a:xfrm>
+        </p:spPr>
+        <p:txBody>
+          <a:bodyPr>
+            <a:noAutofit/>
+          </a:bodyPr>
+          <a:lstStyle/>
+          <a:p>
+            <a:r>
+              <a:rPr lang="en-IN" sz="1800" dirty="0"/>
+              <a:t>Sample Dataset</a:t>
+            </a:r>
+          </a:p>
+        </p:txBody>
+      </p:sp>
+      <p:sp>
+        <p:nvSpPr>
+          <p:cNvPr id="3" name="Content Placeholder 2">
+            <a:extLst>
+              <a:ext uri="{FF2B5EF4-FFF2-40B4-BE49-F238E27FC236}">
+                <a16:creationId xmlns:a16="http://schemas.microsoft.com/office/drawing/2014/main" id="{4A06322B-D7C3-6976-4801-A204D23AA473}"/>
+              </a:ext>
+            </a:extLst>
+          </p:cNvPr>
+          <p:cNvSpPr>
+            <a:spLocks noGrp="1"/>
+          </p:cNvSpPr>
+          <p:nvPr>
+            <p:ph idx="1"/>
+          </p:nvPr>
+        </p:nvSpPr>
+        <p:spPr>
+          <a:xfrm>
+            <a:off x="304800" y="625642"/>
+            <a:ext cx="11582400" cy="6031832"/>
+          </a:xfrm>
+        </p:spPr>
+        <p:txBody>
+          <a:bodyPr>
+            <a:normAutofit/>
+          </a:bodyPr>
+          <a:lstStyle/>
+          <a:p>
+            <a:r>
+              <a:rPr lang="en-IN" sz="1400" dirty="0"/>
+              <a:t>The dataset consist of images and an excel file, which further bifurcates to:</a:t>
+            </a:r>
+          </a:p>
+          <a:p>
+            <a:pPr lvl="1"/>
+            <a:r>
+              <a:rPr lang="en-IN" sz="1000" dirty="0"/>
+              <a:t>Images </a:t>
+            </a:r>
+          </a:p>
+          <a:p>
+            <a:pPr lvl="1"/>
+            <a:r>
+              <a:rPr lang="en-IN" sz="1000" dirty="0"/>
+              <a:t>Grayscale masks (all images are black, unused data)</a:t>
+            </a:r>
+          </a:p>
+          <a:p>
+            <a:pPr lvl="1"/>
+            <a:r>
+              <a:rPr lang="en-IN" sz="1000" dirty="0"/>
+              <a:t>RGB masks</a:t>
+            </a:r>
+          </a:p>
+          <a:p>
+            <a:pPr lvl="1"/>
+            <a:r>
+              <a:rPr lang="en-IN" sz="1000" dirty="0"/>
+              <a:t>Excel file with defect description and object description for each image </a:t>
+            </a:r>
+          </a:p>
+          <a:p>
+            <a:pPr marL="0" indent="0">
+              <a:buNone/>
+            </a:pPr>
+            <a:r>
+              <a:rPr lang="en-IN" sz="1400" dirty="0"/>
+              <a:t>Sample Images and Captions</a:t>
+            </a:r>
+          </a:p>
+          <a:p>
+            <a:pPr marL="0" indent="0">
+              <a:buNone/>
+            </a:pPr>
+            <a:endParaRPr lang="en-IN" sz="1400" dirty="0"/>
+          </a:p>
+        </p:txBody>
+      </p:sp>
+      <p:pic>
+        <p:nvPicPr>
+          <p:cNvPr id="5" name="Picture 4">
+            <a:extLst>
+              <a:ext uri="{FF2B5EF4-FFF2-40B4-BE49-F238E27FC236}">
+                <a16:creationId xmlns:a16="http://schemas.microsoft.com/office/drawing/2014/main" id="{19EFAE4B-2C4E-1354-3FE3-C7FED967312F}"/>
+              </a:ext>
+            </a:extLst>
+          </p:cNvPr>
+          <p:cNvPicPr>
+            <a:picLocks noChangeAspect="1"/>
+          </p:cNvPicPr>
+          <p:nvPr/>
+        </p:nvPicPr>
+        <p:blipFill>
+          <a:blip r:embed="rId2">
+            <a:extLst>
+              <a:ext uri="{28A0092B-C50C-407E-A947-70E740481C1C}">
+                <a14:useLocalDpi xmlns:a14="http://schemas.microsoft.com/office/drawing/2010/main" val="0"/>
+              </a:ext>
+            </a:extLst>
+          </a:blip>
+          <a:stretch>
+            <a:fillRect/>
+          </a:stretch>
+        </p:blipFill>
+        <p:spPr>
+          <a:xfrm>
+            <a:off x="1287378" y="3262383"/>
+            <a:ext cx="3260558" cy="3260558"/>
+          </a:xfrm>
+          <a:prstGeom prst="rect">
+            <a:avLst/>
+          </a:prstGeom>
+        </p:spPr>
+      </p:pic>
+      <p:pic>
+        <p:nvPicPr>
+          <p:cNvPr id="7" name="Picture 6">
+            <a:extLst>
+              <a:ext uri="{FF2B5EF4-FFF2-40B4-BE49-F238E27FC236}">
+                <a16:creationId xmlns:a16="http://schemas.microsoft.com/office/drawing/2014/main" id="{9B07A673-79E2-37F5-1456-2B7100E54635}"/>
+              </a:ext>
+            </a:extLst>
+          </p:cNvPr>
+          <p:cNvPicPr>
+            <a:picLocks noChangeAspect="1"/>
+          </p:cNvPicPr>
+          <p:nvPr/>
+        </p:nvPicPr>
+        <p:blipFill>
+          <a:blip r:embed="rId3">
+            <a:extLst>
+              <a:ext uri="{28A0092B-C50C-407E-A947-70E740481C1C}">
+                <a14:useLocalDpi xmlns:a14="http://schemas.microsoft.com/office/drawing/2010/main" val="0"/>
+              </a:ext>
+            </a:extLst>
+          </a:blip>
+          <a:stretch>
+            <a:fillRect/>
+          </a:stretch>
+        </p:blipFill>
+        <p:spPr>
+          <a:xfrm>
+            <a:off x="7148763" y="3452061"/>
+            <a:ext cx="2884571" cy="2884571"/>
+          </a:xfrm>
+          <a:prstGeom prst="rect">
+            <a:avLst/>
+          </a:prstGeom>
+        </p:spPr>
+      </p:pic>
+      <p:pic>
+        <p:nvPicPr>
+          <p:cNvPr id="9" name="Picture 8">
+            <a:extLst>
+              <a:ext uri="{FF2B5EF4-FFF2-40B4-BE49-F238E27FC236}">
+                <a16:creationId xmlns:a16="http://schemas.microsoft.com/office/drawing/2014/main" id="{89C39FF4-8932-AC5F-917E-7E387F44C6FE}"/>
+              </a:ext>
+            </a:extLst>
+          </p:cNvPr>
+          <p:cNvPicPr>
+            <a:picLocks noChangeAspect="1"/>
+          </p:cNvPicPr>
+          <p:nvPr/>
+        </p:nvPicPr>
+        <p:blipFill>
+          <a:blip r:embed="rId4"/>
+          <a:stretch>
+            <a:fillRect/>
+          </a:stretch>
+        </p:blipFill>
+        <p:spPr>
+          <a:xfrm>
+            <a:off x="0" y="2092859"/>
+            <a:ext cx="12192000" cy="1219835"/>
+          </a:xfrm>
+          <a:prstGeom prst="rect">
+            <a:avLst/>
+          </a:prstGeom>
+        </p:spPr>
+      </p:pic>
+      <p:sp>
+        <p:nvSpPr>
+          <p:cNvPr id="10" name="TextBox 9">
+            <a:extLst>
+              <a:ext uri="{FF2B5EF4-FFF2-40B4-BE49-F238E27FC236}">
+                <a16:creationId xmlns:a16="http://schemas.microsoft.com/office/drawing/2014/main" id="{0C094F71-1869-37E1-4CD7-621F3F47D8E0}"/>
+              </a:ext>
+            </a:extLst>
+          </p:cNvPr>
+          <p:cNvSpPr txBox="1"/>
+          <p:nvPr/>
+        </p:nvSpPr>
+        <p:spPr>
+          <a:xfrm>
+            <a:off x="1861833" y="6424500"/>
+            <a:ext cx="2084417" cy="369332"/>
+          </a:xfrm>
+          <a:prstGeom prst="rect">
+            <a:avLst/>
+          </a:prstGeom>
+          <a:noFill/>
+        </p:spPr>
+        <p:txBody>
+          <a:bodyPr wrap="none" rtlCol="0">
+            <a:spAutoFit/>
+          </a:bodyPr>
+          <a:lstStyle/>
+          <a:p>
+            <a:r>
+              <a:rPr lang="en-IN" dirty="0"/>
+              <a:t>Broken bottle image</a:t>
+            </a:r>
+          </a:p>
+        </p:txBody>
+      </p:sp>
+      <p:sp>
+        <p:nvSpPr>
+          <p:cNvPr id="11" name="TextBox 10">
+            <a:extLst>
+              <a:ext uri="{FF2B5EF4-FFF2-40B4-BE49-F238E27FC236}">
+                <a16:creationId xmlns:a16="http://schemas.microsoft.com/office/drawing/2014/main" id="{C2D71B37-5056-D844-2FFC-CC6CD8559EC1}"/>
+              </a:ext>
+            </a:extLst>
+          </p:cNvPr>
+          <p:cNvSpPr txBox="1"/>
+          <p:nvPr/>
+        </p:nvSpPr>
+        <p:spPr>
+          <a:xfrm>
+            <a:off x="6927387" y="6448563"/>
+            <a:ext cx="3327321" cy="369332"/>
+          </a:xfrm>
+          <a:prstGeom prst="rect">
+            <a:avLst/>
+          </a:prstGeom>
+          <a:noFill/>
+        </p:spPr>
+        <p:txBody>
+          <a:bodyPr wrap="none" rtlCol="0">
+            <a:spAutoFit/>
+          </a:bodyPr>
+          <a:lstStyle/>
+          <a:p>
+            <a:r>
+              <a:rPr lang="en-IN" dirty="0"/>
+              <a:t>RGB Mask of Broken bottle image</a:t>
+            </a:r>
+          </a:p>
+        </p:txBody>
+      </p:sp>
+    </p:spTree>
+    <p:extLst>
+      <p:ext uri="{BB962C8B-B14F-4D97-AF65-F5344CB8AC3E}">
+        <p14:creationId xmlns:p14="http://schemas.microsoft.com/office/powerpoint/2010/main" val="1716881330"/>
+      </p:ext>
+    </p:extLst>
+  </p:cSld>
+  <p:clrMapOvr>
+    <a:masterClrMapping/>
+  </p:clrMapOvr>
+</p:sld>
+</file>
+
+<file path=ppt/slides/slide4.xml><?xml version="1.0" encoding="utf-8"?>
+<p:sld xmlns:a="http://schemas.openxmlformats.org/drawingml/2006/main" xmlns:r="http://schemas.openxmlformats.org/officeDocument/2006/relationships" xmlns:p="http://schemas.openxmlformats.org/presentationml/2006/main">
+  <p:cSld>
+    <p:spTree>
+      <p:nvGrpSpPr>
+        <p:cNvPr id="1" name="">
+          <a:extLst>
+            <a:ext uri="{FF2B5EF4-FFF2-40B4-BE49-F238E27FC236}">
+              <a16:creationId xmlns:a16="http://schemas.microsoft.com/office/drawing/2014/main" id="{012A543E-1449-E0EF-B262-99B128BF1B77}"/>
+            </a:ext>
+          </a:extLst>
+        </p:cNvPr>
+        <p:cNvGrpSpPr/>
+        <p:nvPr/>
+      </p:nvGrpSpPr>
+      <p:grpSpPr>
+        <a:xfrm>
+          <a:off x="0" y="0"/>
+          <a:ext cx="0" cy="0"/>
+          <a:chOff x="0" y="0"/>
+          <a:chExt cx="0" cy="0"/>
+        </a:xfrm>
+      </p:grpSpPr>
+      <p:sp>
+        <p:nvSpPr>
+          <p:cNvPr id="2" name="Title 1">
+            <a:extLst>
+              <a:ext uri="{FF2B5EF4-FFF2-40B4-BE49-F238E27FC236}">
+                <a16:creationId xmlns:a16="http://schemas.microsoft.com/office/drawing/2014/main" id="{15987829-80D4-5453-53D4-485977ACEF93}"/>
+              </a:ext>
+            </a:extLst>
+          </p:cNvPr>
+          <p:cNvSpPr>
+            <a:spLocks noGrp="1"/>
+          </p:cNvSpPr>
+          <p:nvPr>
+            <p:ph type="title"/>
+          </p:nvPr>
+        </p:nvSpPr>
+        <p:spPr>
+          <a:xfrm>
+            <a:off x="838200" y="64168"/>
+            <a:ext cx="10515600" cy="408323"/>
+          </a:xfrm>
+        </p:spPr>
+        <p:txBody>
+          <a:bodyPr>
+            <a:noAutofit/>
+          </a:bodyPr>
+          <a:lstStyle/>
+          <a:p>
+            <a:r>
+              <a:rPr lang="en-IN" sz="1800" dirty="0"/>
+              <a:t>Objective and Problem Statement</a:t>
+            </a:r>
+          </a:p>
+        </p:txBody>
+      </p:sp>
+      <p:sp>
+        <p:nvSpPr>
+          <p:cNvPr id="3" name="Content Placeholder 2">
+            <a:extLst>
+              <a:ext uri="{FF2B5EF4-FFF2-40B4-BE49-F238E27FC236}">
+                <a16:creationId xmlns:a16="http://schemas.microsoft.com/office/drawing/2014/main" id="{ED3E33CE-2A78-D2AB-8C87-15AF8AC054E4}"/>
+              </a:ext>
+            </a:extLst>
+          </p:cNvPr>
+          <p:cNvSpPr>
+            <a:spLocks noGrp="1"/>
+          </p:cNvSpPr>
+          <p:nvPr>
+            <p:ph idx="1"/>
+          </p:nvPr>
+        </p:nvSpPr>
+        <p:spPr>
+          <a:xfrm>
+            <a:off x="838200" y="625642"/>
+            <a:ext cx="10515600" cy="5551321"/>
+          </a:xfrm>
+        </p:spPr>
+        <p:txBody>
+          <a:bodyPr>
+            <a:normAutofit/>
+          </a:bodyPr>
+          <a:lstStyle/>
+          <a:p>
+            <a:r>
+              <a:rPr lang="en-IN" sz="1400" dirty="0"/>
+              <a:t>Generate synthetic defect images using Stable Diffusion.</a:t>
+            </a:r>
+          </a:p>
+          <a:p>
+            <a:r>
+              <a:rPr lang="en-US" sz="1400" dirty="0"/>
+              <a:t>Condition generation on textual prompts (e.g., "a pill with a vertical scratch") and binary masks (e.g., defect regions).</a:t>
+            </a:r>
+            <a:endParaRPr lang="en-IN" sz="1400" dirty="0"/>
+          </a:p>
+          <a:p>
+            <a:r>
+              <a:rPr lang="en-US" sz="1400" dirty="0"/>
+              <a:t>Real-world defect datasets are often limited, imbalanced, or expensive to collect.</a:t>
+            </a:r>
+          </a:p>
+          <a:p>
+            <a:r>
+              <a:rPr lang="en-US" sz="1400" dirty="0"/>
+              <a:t>Synthetic data can augment datasets for training robust defect detection models.</a:t>
+            </a:r>
+          </a:p>
+          <a:p>
+            <a:pPr marL="0" indent="0">
+              <a:buNone/>
+            </a:pPr>
+            <a:endParaRPr lang="en-US" sz="1400" dirty="0"/>
+          </a:p>
+          <a:p>
+            <a:pPr marL="0" indent="0">
+              <a:buNone/>
+            </a:pPr>
+            <a:r>
+              <a:rPr lang="en-US" sz="1400" dirty="0"/>
+              <a:t>Benefits:</a:t>
+            </a:r>
+          </a:p>
+          <a:p>
+            <a:pPr lvl="1"/>
+            <a:r>
+              <a:rPr lang="en-US" sz="1400" dirty="0"/>
+              <a:t>Cost-effective and scalable data generation.</a:t>
+            </a:r>
+          </a:p>
+          <a:p>
+            <a:pPr lvl="1"/>
+            <a:r>
+              <a:rPr lang="en-US" sz="1400" dirty="0"/>
+              <a:t>Improved performance of defect detection algorithms.</a:t>
+            </a:r>
+          </a:p>
+          <a:p>
+            <a:pPr marL="457200" lvl="1" indent="0">
+              <a:buNone/>
+            </a:pPr>
+            <a:endParaRPr lang="en-US" sz="1400" dirty="0"/>
+          </a:p>
+          <a:p>
+            <a:pPr marL="0" indent="0">
+              <a:buNone/>
+            </a:pPr>
+            <a:endParaRPr lang="en-IN" sz="1400" dirty="0"/>
+          </a:p>
+        </p:txBody>
+      </p:sp>
+    </p:spTree>
+    <p:extLst>
+      <p:ext uri="{BB962C8B-B14F-4D97-AF65-F5344CB8AC3E}">
+        <p14:creationId xmlns:p14="http://schemas.microsoft.com/office/powerpoint/2010/main" val="469288147"/>
       </p:ext>
     </p:extLst>
   </p:cSld>

</xml_diff>